<commit_message>
Alg e Comp Árvore de Recursão 15102025
</commit_message>
<xml_diff>
--- a/01 Classes/Aula 09 - Algoritmos e Complexidade - Programação Dinâmica.pptx
+++ b/01 Classes/Aula 09 - Algoritmos e Complexidade - Programação Dinâmica.pptx
@@ -4881,8 +4881,8 @@
         </p:nvSpPr>
         <p:spPr>
           <a:xfrm>
-            <a:off x="142865" y="1200150"/>
-            <a:ext cx="8865056" cy="3737370"/>
+            <a:off x="142865" y="1081576"/>
+            <a:ext cx="8865056" cy="3974518"/>
           </a:xfrm>
         </p:spPr>
         <p:txBody>
@@ -4926,8 +4926,8 @@
         </p:blipFill>
         <p:spPr>
           <a:xfrm>
-            <a:off x="1126675" y="1227044"/>
-            <a:ext cx="5005184" cy="3690973"/>
+            <a:off x="201705" y="1111832"/>
+            <a:ext cx="5298141" cy="3907008"/>
           </a:xfrm>
           <a:prstGeom prst="rect">
             <a:avLst/>
@@ -4948,8 +4948,8 @@
         </p:nvSpPr>
         <p:spPr>
           <a:xfrm>
-            <a:off x="6239435" y="2003612"/>
-            <a:ext cx="2622177" cy="1200325"/>
+            <a:off x="5701553" y="2213634"/>
+            <a:ext cx="2447366" cy="1200325"/>
           </a:xfrm>
           <a:prstGeom prst="rect">
             <a:avLst/>
@@ -5310,9 +5310,9 @@
               <a:t> </a:t>
             </a:r>
             <a:r>
-              <a:rPr lang="pt-BR" sz="2000" dirty="0" err="1">
-                <a:solidFill>
-                  <a:schemeClr val="tx1"/>
+              <a:rPr lang="pt-BR" sz="2000" b="1" dirty="0" err="1">
+                <a:solidFill>
+                  <a:srgbClr val="FF0000"/>
                 </a:solidFill>
                 <a:latin typeface="Times New Roman" panose="02020603050405020304" pitchFamily="18" charset="0"/>
                 <a:cs typeface="Times New Roman" panose="02020603050405020304" pitchFamily="18" charset="0"/>
@@ -5405,7 +5405,7 @@
               <a:t> </a:t>
             </a:r>
             <a:r>
-              <a:rPr lang="pt-BR" sz="2000" dirty="0" err="1">
+              <a:rPr lang="pt-BR" sz="2000" b="1" dirty="0" err="1">
                 <a:solidFill>
                   <a:schemeClr val="tx1"/>
                 </a:solidFill>
@@ -5477,7 +5477,27 @@
                 <a:latin typeface="Times New Roman" panose="02020603050405020304" pitchFamily="18" charset="0"/>
                 <a:cs typeface="Times New Roman" panose="02020603050405020304" pitchFamily="18" charset="0"/>
               </a:rPr>
-              <a:t>[] f = new </a:t>
+              <a:t>[] f = </a:t>
+            </a:r>
+            <a:r>
+              <a:rPr lang="pt-BR" sz="2000" dirty="0">
+                <a:solidFill>
+                  <a:srgbClr val="FF0000"/>
+                </a:solidFill>
+                <a:latin typeface="Times New Roman" panose="02020603050405020304" pitchFamily="18" charset="0"/>
+                <a:cs typeface="Times New Roman" panose="02020603050405020304" pitchFamily="18" charset="0"/>
+              </a:rPr>
+              <a:t>new</a:t>
+            </a:r>
+            <a:r>
+              <a:rPr lang="pt-BR" sz="2000" dirty="0">
+                <a:solidFill>
+                  <a:schemeClr val="tx1"/>
+                </a:solidFill>
+                <a:latin typeface="Times New Roman" panose="02020603050405020304" pitchFamily="18" charset="0"/>
+                <a:cs typeface="Times New Roman" panose="02020603050405020304" pitchFamily="18" charset="0"/>
+              </a:rPr>
+              <a:t> </a:t>
             </a:r>
             <a:r>
               <a:rPr lang="pt-BR" sz="2000" dirty="0" err="1">
@@ -5497,7 +5517,107 @@
                 <a:latin typeface="Times New Roman" panose="02020603050405020304" pitchFamily="18" charset="0"/>
                 <a:cs typeface="Times New Roman" panose="02020603050405020304" pitchFamily="18" charset="0"/>
               </a:rPr>
-              <a:t>[n + 1]; f[0] = 0;    f[1] = 1;</a:t>
+              <a:t>[</a:t>
+            </a:r>
+            <a:r>
+              <a:rPr lang="pt-BR" sz="2000" b="1" dirty="0">
+                <a:solidFill>
+                  <a:schemeClr val="tx1"/>
+                </a:solidFill>
+                <a:latin typeface="Times New Roman" panose="02020603050405020304" pitchFamily="18" charset="0"/>
+                <a:cs typeface="Times New Roman" panose="02020603050405020304" pitchFamily="18" charset="0"/>
+              </a:rPr>
+              <a:t>n + 1</a:t>
+            </a:r>
+            <a:r>
+              <a:rPr lang="pt-BR" sz="2000" dirty="0">
+                <a:solidFill>
+                  <a:schemeClr val="tx1"/>
+                </a:solidFill>
+                <a:latin typeface="Times New Roman" panose="02020603050405020304" pitchFamily="18" charset="0"/>
+                <a:cs typeface="Times New Roman" panose="02020603050405020304" pitchFamily="18" charset="0"/>
+              </a:rPr>
+              <a:t>]; </a:t>
+            </a:r>
+            <a:r>
+              <a:rPr lang="pt-BR" sz="2000" b="1" dirty="0">
+                <a:solidFill>
+                  <a:schemeClr val="tx1"/>
+                </a:solidFill>
+                <a:latin typeface="Times New Roman" panose="02020603050405020304" pitchFamily="18" charset="0"/>
+                <a:cs typeface="Times New Roman" panose="02020603050405020304" pitchFamily="18" charset="0"/>
+              </a:rPr>
+              <a:t>f[0] </a:t>
+            </a:r>
+            <a:r>
+              <a:rPr lang="pt-BR" sz="2000" dirty="0">
+                <a:solidFill>
+                  <a:schemeClr val="tx1"/>
+                </a:solidFill>
+                <a:latin typeface="Times New Roman" panose="02020603050405020304" pitchFamily="18" charset="0"/>
+                <a:cs typeface="Times New Roman" panose="02020603050405020304" pitchFamily="18" charset="0"/>
+              </a:rPr>
+              <a:t>= </a:t>
+            </a:r>
+            <a:r>
+              <a:rPr lang="pt-BR" sz="2000" b="1" dirty="0">
+                <a:solidFill>
+                  <a:srgbClr val="FF0000"/>
+                </a:solidFill>
+                <a:latin typeface="Times New Roman" panose="02020603050405020304" pitchFamily="18" charset="0"/>
+                <a:cs typeface="Times New Roman" panose="02020603050405020304" pitchFamily="18" charset="0"/>
+              </a:rPr>
+              <a:t>0</a:t>
+            </a:r>
+            <a:r>
+              <a:rPr lang="pt-BR" sz="2000" dirty="0">
+                <a:solidFill>
+                  <a:schemeClr val="tx1"/>
+                </a:solidFill>
+                <a:latin typeface="Times New Roman" panose="02020603050405020304" pitchFamily="18" charset="0"/>
+                <a:cs typeface="Times New Roman" panose="02020603050405020304" pitchFamily="18" charset="0"/>
+              </a:rPr>
+              <a:t>;    </a:t>
+            </a:r>
+            <a:r>
+              <a:rPr lang="pt-BR" sz="2000" b="1" dirty="0">
+                <a:solidFill>
+                  <a:schemeClr val="tx1"/>
+                </a:solidFill>
+                <a:latin typeface="Times New Roman" panose="02020603050405020304" pitchFamily="18" charset="0"/>
+                <a:cs typeface="Times New Roman" panose="02020603050405020304" pitchFamily="18" charset="0"/>
+              </a:rPr>
+              <a:t>f[1] </a:t>
+            </a:r>
+            <a:r>
+              <a:rPr lang="pt-BR" sz="2000" dirty="0">
+                <a:solidFill>
+                  <a:schemeClr val="tx1"/>
+                </a:solidFill>
+                <a:latin typeface="Times New Roman" panose="02020603050405020304" pitchFamily="18" charset="0"/>
+                <a:cs typeface="Times New Roman" panose="02020603050405020304" pitchFamily="18" charset="0"/>
+              </a:rPr>
+              <a:t>= </a:t>
+            </a:r>
+            <a:r>
+              <a:rPr lang="pt-BR" sz="2000" b="1" dirty="0">
+                <a:solidFill>
+                  <a:srgbClr val="FF0000"/>
+                </a:solidFill>
+                <a:latin typeface="Times New Roman" panose="02020603050405020304" pitchFamily="18" charset="0"/>
+                <a:cs typeface="Times New Roman" panose="02020603050405020304" pitchFamily="18" charset="0"/>
+              </a:rPr>
+              <a:t>1</a:t>
+            </a:r>
+            <a:r>
+              <a:rPr lang="pt-BR" sz="2000" dirty="0">
+                <a:solidFill>
+                  <a:schemeClr val="tx1"/>
+                </a:solidFill>
+                <a:latin typeface="Times New Roman" panose="02020603050405020304" pitchFamily="18" charset="0"/>
+                <a:cs typeface="Times New Roman" panose="02020603050405020304" pitchFamily="18" charset="0"/>
+              </a:rPr>
+              <a:t>;</a:t>
             </a:r>
           </a:p>
           <a:p>
@@ -5512,7 +5632,27 @@
                 <a:latin typeface="Times New Roman" panose="02020603050405020304" pitchFamily="18" charset="0"/>
                 <a:cs typeface="Times New Roman" panose="02020603050405020304" pitchFamily="18" charset="0"/>
               </a:rPr>
-              <a:t>        for (</a:t>
+              <a:t>        </a:t>
+            </a:r>
+            <a:r>
+              <a:rPr lang="pt-BR" sz="2000" b="1" dirty="0">
+                <a:solidFill>
+                  <a:schemeClr val="tx1"/>
+                </a:solidFill>
+                <a:latin typeface="Times New Roman" panose="02020603050405020304" pitchFamily="18" charset="0"/>
+                <a:cs typeface="Times New Roman" panose="02020603050405020304" pitchFamily="18" charset="0"/>
+              </a:rPr>
+              <a:t>for</a:t>
+            </a:r>
+            <a:r>
+              <a:rPr lang="pt-BR" sz="2000" dirty="0">
+                <a:solidFill>
+                  <a:schemeClr val="tx1"/>
+                </a:solidFill>
+                <a:latin typeface="Times New Roman" panose="02020603050405020304" pitchFamily="18" charset="0"/>
+                <a:cs typeface="Times New Roman" panose="02020603050405020304" pitchFamily="18" charset="0"/>
+              </a:rPr>
+              <a:t> (</a:t>
             </a:r>
             <a:r>
               <a:rPr lang="pt-BR" sz="2000" dirty="0" err="1">
@@ -5532,7 +5672,27 @@
                 <a:latin typeface="Times New Roman" panose="02020603050405020304" pitchFamily="18" charset="0"/>
                 <a:cs typeface="Times New Roman" panose="02020603050405020304" pitchFamily="18" charset="0"/>
               </a:rPr>
-              <a:t> i = 2; i &lt;= n; i++) {</a:t>
+              <a:t> i = </a:t>
+            </a:r>
+            <a:r>
+              <a:rPr lang="pt-BR" sz="2000" b="1" dirty="0">
+                <a:solidFill>
+                  <a:srgbClr val="FF0000"/>
+                </a:solidFill>
+                <a:latin typeface="Times New Roman" panose="02020603050405020304" pitchFamily="18" charset="0"/>
+                <a:cs typeface="Times New Roman" panose="02020603050405020304" pitchFamily="18" charset="0"/>
+              </a:rPr>
+              <a:t>2</a:t>
+            </a:r>
+            <a:r>
+              <a:rPr lang="pt-BR" sz="2000" dirty="0">
+                <a:solidFill>
+                  <a:schemeClr val="tx1"/>
+                </a:solidFill>
+                <a:latin typeface="Times New Roman" panose="02020603050405020304" pitchFamily="18" charset="0"/>
+                <a:cs typeface="Times New Roman" panose="02020603050405020304" pitchFamily="18" charset="0"/>
+              </a:rPr>
+              <a:t>; i &lt;= n; i++) {</a:t>
             </a:r>
           </a:p>
           <a:p>
@@ -5547,7 +5707,27 @@
                 <a:latin typeface="Times New Roman" panose="02020603050405020304" pitchFamily="18" charset="0"/>
                 <a:cs typeface="Times New Roman" panose="02020603050405020304" pitchFamily="18" charset="0"/>
               </a:rPr>
-              <a:t>            f[i] = f[i - 1] + f[i - 2];</a:t>
+              <a:t>            f[i] = </a:t>
+            </a:r>
+            <a:r>
+              <a:rPr lang="pt-BR" sz="2000" b="1" dirty="0">
+                <a:solidFill>
+                  <a:schemeClr val="tx1"/>
+                </a:solidFill>
+                <a:latin typeface="Times New Roman" panose="02020603050405020304" pitchFamily="18" charset="0"/>
+                <a:cs typeface="Times New Roman" panose="02020603050405020304" pitchFamily="18" charset="0"/>
+              </a:rPr>
+              <a:t>f[i - 1] + f[i - 2]</a:t>
+            </a:r>
+            <a:r>
+              <a:rPr lang="pt-BR" sz="2000" dirty="0">
+                <a:solidFill>
+                  <a:schemeClr val="tx1"/>
+                </a:solidFill>
+                <a:latin typeface="Times New Roman" panose="02020603050405020304" pitchFamily="18" charset="0"/>
+                <a:cs typeface="Times New Roman" panose="02020603050405020304" pitchFamily="18" charset="0"/>
+              </a:rPr>
+              <a:t>;</a:t>
             </a:r>
           </a:p>
           <a:p>
@@ -5580,7 +5760,7 @@
               <a:t>        </a:t>
             </a:r>
             <a:r>
-              <a:rPr lang="pt-BR" sz="2000" dirty="0" err="1">
+              <a:rPr lang="pt-BR" sz="2000" b="1" dirty="0" err="1">
                 <a:solidFill>
                   <a:schemeClr val="tx1"/>
                 </a:solidFill>
@@ -5620,7 +5800,7 @@
               <a:buNone/>
             </a:pPr>
             <a:r>
-              <a:rPr lang="pt-BR" sz="2000" dirty="0">
+              <a:rPr lang="pt-BR" sz="2000" b="1" dirty="0">
                 <a:solidFill>
                   <a:schemeClr val="tx1"/>
                 </a:solidFill>
@@ -5630,7 +5810,7 @@
               <a:t>    </a:t>
             </a:r>
             <a:r>
-              <a:rPr lang="pt-BR" sz="2000" dirty="0" err="1">
+              <a:rPr lang="pt-BR" sz="2000" b="1" dirty="0" err="1">
                 <a:solidFill>
                   <a:schemeClr val="tx1"/>
                 </a:solidFill>
@@ -5640,7 +5820,7 @@
               <a:t>public</a:t>
             </a:r>
             <a:r>
-              <a:rPr lang="pt-BR" sz="2000" dirty="0">
+              <a:rPr lang="pt-BR" sz="2000" b="1" dirty="0">
                 <a:solidFill>
                   <a:schemeClr val="tx1"/>
                 </a:solidFill>
@@ -5650,7 +5830,7 @@
               <a:t> </a:t>
             </a:r>
             <a:r>
-              <a:rPr lang="pt-BR" sz="2000" dirty="0" err="1">
+              <a:rPr lang="pt-BR" sz="2000" b="1" dirty="0" err="1">
                 <a:solidFill>
                   <a:schemeClr val="tx1"/>
                 </a:solidFill>
@@ -5660,7 +5840,7 @@
               <a:t>static</a:t>
             </a:r>
             <a:r>
-              <a:rPr lang="pt-BR" sz="2000" dirty="0">
+              <a:rPr lang="pt-BR" sz="2000" b="1" dirty="0">
                 <a:solidFill>
                   <a:schemeClr val="tx1"/>
                 </a:solidFill>
@@ -5670,7 +5850,7 @@
               <a:t> </a:t>
             </a:r>
             <a:r>
-              <a:rPr lang="pt-BR" sz="2000" dirty="0" err="1">
+              <a:rPr lang="pt-BR" sz="2000" b="1" dirty="0" err="1">
                 <a:solidFill>
                   <a:schemeClr val="tx1"/>
                 </a:solidFill>
@@ -5680,7 +5860,7 @@
               <a:t>void</a:t>
             </a:r>
             <a:r>
-              <a:rPr lang="pt-BR" sz="2000" dirty="0">
+              <a:rPr lang="pt-BR" sz="2000" b="1" dirty="0">
                 <a:solidFill>
                   <a:schemeClr val="tx1"/>
                 </a:solidFill>
@@ -5690,7 +5870,7 @@
               <a:t> </a:t>
             </a:r>
             <a:r>
-              <a:rPr lang="pt-BR" sz="2000" dirty="0" err="1">
+              <a:rPr lang="pt-BR" sz="2000" b="1" dirty="0" err="1">
                 <a:solidFill>
                   <a:schemeClr val="tx1"/>
                 </a:solidFill>
@@ -5785,7 +5965,7 @@
               <a:t>(</a:t>
             </a:r>
             <a:r>
-              <a:rPr lang="pt-BR" sz="2000" dirty="0" err="1">
+              <a:rPr lang="pt-BR" sz="2000" b="1" dirty="0" err="1">
                 <a:solidFill>
                   <a:schemeClr val="tx1"/>
                 </a:solidFill>
@@ -5802,7 +5982,27 @@
                 <a:latin typeface="Times New Roman" panose="02020603050405020304" pitchFamily="18" charset="0"/>
                 <a:cs typeface="Times New Roman" panose="02020603050405020304" pitchFamily="18" charset="0"/>
               </a:rPr>
-              <a:t>(40));</a:t>
+              <a:t>(</a:t>
+            </a:r>
+            <a:r>
+              <a:rPr lang="pt-BR" sz="2000" b="1" dirty="0">
+                <a:solidFill>
+                  <a:srgbClr val="FF0000"/>
+                </a:solidFill>
+                <a:latin typeface="Times New Roman" panose="02020603050405020304" pitchFamily="18" charset="0"/>
+                <a:cs typeface="Times New Roman" panose="02020603050405020304" pitchFamily="18" charset="0"/>
+              </a:rPr>
+              <a:t>40</a:t>
+            </a:r>
+            <a:r>
+              <a:rPr lang="pt-BR" sz="2000" dirty="0">
+                <a:solidFill>
+                  <a:schemeClr val="tx1"/>
+                </a:solidFill>
+                <a:latin typeface="Times New Roman" panose="02020603050405020304" pitchFamily="18" charset="0"/>
+                <a:cs typeface="Times New Roman" panose="02020603050405020304" pitchFamily="18" charset="0"/>
+              </a:rPr>
+              <a:t>));</a:t>
             </a:r>
           </a:p>
           <a:p>
@@ -5892,41 +6092,81 @@
               </a:p>
               <a:p>
                 <a:r>
+                  <a:rPr lang="pt-BR" b="1" dirty="0">
+                    <a:latin typeface="Times New Roman" panose="02020603050405020304" pitchFamily="18" charset="0"/>
+                    <a:cs typeface="Times New Roman" panose="02020603050405020304" pitchFamily="18" charset="0"/>
+                  </a:rPr>
+                  <a:t>Recursivo</a:t>
+                </a:r>
+                <a:r>
                   <a:rPr lang="pt-BR" dirty="0">
                     <a:latin typeface="Times New Roman" panose="02020603050405020304" pitchFamily="18" charset="0"/>
                     <a:cs typeface="Times New Roman" panose="02020603050405020304" pitchFamily="18" charset="0"/>
                   </a:rPr>
-                  <a:t>Recursivo simples: </a:t>
+                  <a:t> </a:t>
+                </a:r>
+                <a:r>
+                  <a:rPr lang="pt-BR" b="1" dirty="0">
+                    <a:latin typeface="Times New Roman" panose="02020603050405020304" pitchFamily="18" charset="0"/>
+                    <a:cs typeface="Times New Roman" panose="02020603050405020304" pitchFamily="18" charset="0"/>
+                  </a:rPr>
+                  <a:t>simples</a:t>
+                </a:r>
+                <a:r>
+                  <a:rPr lang="pt-BR" dirty="0">
+                    <a:latin typeface="Times New Roman" panose="02020603050405020304" pitchFamily="18" charset="0"/>
+                    <a:cs typeface="Times New Roman" panose="02020603050405020304" pitchFamily="18" charset="0"/>
+                  </a:rPr>
+                  <a:t>: </a:t>
                 </a:r>
                 <a14:m>
                   <m:oMath xmlns:m="http://schemas.openxmlformats.org/officeDocument/2006/math">
                     <m:r>
-                      <a:rPr lang="pt-BR" i="1"/>
+                      <a:rPr lang="pt-BR" i="1">
+                        <a:latin typeface="Cambria Math" panose="02040503050406030204" pitchFamily="18" charset="0"/>
+                      </a:rPr>
                       <m:t>𝑂</m:t>
                     </m:r>
                     <m:d>
                       <m:dPr>
                         <m:ctrlPr>
-                          <a:rPr lang="ar-AE" i="1"/>
+                          <a:rPr lang="ar-AE" i="1">
+                            <a:latin typeface="Cambria Math" panose="02040503050406030204" pitchFamily="18" charset="0"/>
+                          </a:rPr>
                         </m:ctrlPr>
                       </m:dPr>
                       <m:e>
                         <m:sSup>
                           <m:sSupPr>
                             <m:ctrlPr>
-                              <a:rPr lang="ar-AE" i="1"/>
+                              <a:rPr lang="ar-AE" b="1" i="1" smtClean="0">
+                                <a:solidFill>
+                                  <a:srgbClr val="FF0000"/>
+                                </a:solidFill>
+                                <a:latin typeface="Cambria Math" panose="02040503050406030204" pitchFamily="18" charset="0"/>
+                              </a:rPr>
                             </m:ctrlPr>
                           </m:sSupPr>
                           <m:e>
                             <m:r>
-                              <a:rPr lang="ar-AE"/>
-                              <m:t>2</m:t>
+                              <a:rPr lang="ar-AE" b="1" i="1">
+                                <a:solidFill>
+                                  <a:srgbClr val="FF0000"/>
+                                </a:solidFill>
+                                <a:latin typeface="Cambria Math" panose="02040503050406030204" pitchFamily="18" charset="0"/>
+                              </a:rPr>
+                              <m:t>𝟐</m:t>
                             </m:r>
                           </m:e>
                           <m:sup>
                             <m:r>
-                              <a:rPr lang="ar-AE" i="1"/>
-                              <m:t>𝑛</m:t>
+                              <a:rPr lang="ar-AE" b="1" i="1">
+                                <a:solidFill>
+                                  <a:srgbClr val="FF0000"/>
+                                </a:solidFill>
+                                <a:latin typeface="Cambria Math" panose="02040503050406030204" pitchFamily="18" charset="0"/>
+                              </a:rPr>
+                              <m:t>𝒏</m:t>
                             </m:r>
                           </m:sup>
                         </m:sSup>
@@ -5941,28 +6181,44 @@
               </a:p>
               <a:p>
                 <a:r>
+                  <a:rPr lang="pt-BR" b="1" dirty="0">
+                    <a:latin typeface="Times New Roman" panose="02020603050405020304" pitchFamily="18" charset="0"/>
+                    <a:cs typeface="Times New Roman" panose="02020603050405020304" pitchFamily="18" charset="0"/>
+                  </a:rPr>
+                  <a:t>PD</a:t>
+                </a:r>
+                <a:r>
                   <a:rPr lang="pt-BR" dirty="0">
                     <a:latin typeface="Times New Roman" panose="02020603050405020304" pitchFamily="18" charset="0"/>
                     <a:cs typeface="Times New Roman" panose="02020603050405020304" pitchFamily="18" charset="0"/>
                   </a:rPr>
-                  <a:t>PD: </a:t>
+                  <a:t>: </a:t>
                 </a:r>
                 <a14:m>
                   <m:oMath xmlns:m="http://schemas.openxmlformats.org/officeDocument/2006/math">
                     <m:r>
-                      <a:rPr lang="pt-BR" i="1"/>
+                      <a:rPr lang="pt-BR" i="1">
+                        <a:latin typeface="Cambria Math" panose="02040503050406030204" pitchFamily="18" charset="0"/>
+                      </a:rPr>
                       <m:t>𝑂</m:t>
                     </m:r>
                     <m:d>
                       <m:dPr>
                         <m:ctrlPr>
-                          <a:rPr lang="ar-AE" i="1"/>
+                          <a:rPr lang="ar-AE" i="1">
+                            <a:latin typeface="Cambria Math" panose="02040503050406030204" pitchFamily="18" charset="0"/>
+                          </a:rPr>
                         </m:ctrlPr>
                       </m:dPr>
                       <m:e>
                         <m:r>
-                          <a:rPr lang="ar-AE" i="1"/>
-                          <m:t>𝑛</m:t>
+                          <a:rPr lang="ar-AE" b="1" i="1" smtClean="0">
+                            <a:solidFill>
+                              <a:srgbClr val="FF0000"/>
+                            </a:solidFill>
+                            <a:latin typeface="Cambria Math" panose="02040503050406030204" pitchFamily="18" charset="0"/>
+                          </a:rPr>
+                          <m:t>𝒏</m:t>
                         </m:r>
                       </m:e>
                     </m:d>
@@ -6228,7 +6484,52 @@
                 <a:latin typeface="Times New Roman" panose="02020603050405020304" pitchFamily="18" charset="0"/>
                 <a:cs typeface="Times New Roman" panose="02020603050405020304" pitchFamily="18" charset="0"/>
               </a:rPr>
-              <a:t>Dado um conjunto de itens com peso e valor, determine o valor máximo que pode ser levado em uma mochila com capacidade limitada.</a:t>
+              <a:t>	Dado um </a:t>
+            </a:r>
+            <a:r>
+              <a:rPr lang="pt-BR" sz="2000" b="1" dirty="0">
+                <a:latin typeface="Times New Roman" panose="02020603050405020304" pitchFamily="18" charset="0"/>
+                <a:cs typeface="Times New Roman" panose="02020603050405020304" pitchFamily="18" charset="0"/>
+              </a:rPr>
+              <a:t>conjunto de itens com peso e valor</a:t>
+            </a:r>
+            <a:r>
+              <a:rPr lang="pt-BR" sz="2000" dirty="0">
+                <a:latin typeface="Times New Roman" panose="02020603050405020304" pitchFamily="18" charset="0"/>
+                <a:cs typeface="Times New Roman" panose="02020603050405020304" pitchFamily="18" charset="0"/>
+              </a:rPr>
+              <a:t>, </a:t>
+            </a:r>
+            <a:r>
+              <a:rPr lang="pt-BR" sz="2000" b="1" dirty="0">
+                <a:solidFill>
+                  <a:srgbClr val="FF0000"/>
+                </a:solidFill>
+                <a:latin typeface="Times New Roman" panose="02020603050405020304" pitchFamily="18" charset="0"/>
+                <a:cs typeface="Times New Roman" panose="02020603050405020304" pitchFamily="18" charset="0"/>
+              </a:rPr>
+              <a:t>determine o valor máximo </a:t>
+            </a:r>
+            <a:r>
+              <a:rPr lang="pt-BR" sz="2000" dirty="0">
+                <a:latin typeface="Times New Roman" panose="02020603050405020304" pitchFamily="18" charset="0"/>
+                <a:cs typeface="Times New Roman" panose="02020603050405020304" pitchFamily="18" charset="0"/>
+              </a:rPr>
+              <a:t>que pode ser levado em uma </a:t>
+            </a:r>
+            <a:r>
+              <a:rPr lang="pt-BR" sz="2000" b="1" dirty="0">
+                <a:latin typeface="Times New Roman" panose="02020603050405020304" pitchFamily="18" charset="0"/>
+                <a:cs typeface="Times New Roman" panose="02020603050405020304" pitchFamily="18" charset="0"/>
+              </a:rPr>
+              <a:t>mochila com capacidade limitada</a:t>
+            </a:r>
+            <a:r>
+              <a:rPr lang="pt-BR" sz="2000" dirty="0">
+                <a:latin typeface="Times New Roman" panose="02020603050405020304" pitchFamily="18" charset="0"/>
+                <a:cs typeface="Times New Roman" panose="02020603050405020304" pitchFamily="18" charset="0"/>
+              </a:rPr>
+              <a:t>.</a:t>
             </a:r>
           </a:p>
           <a:p>
@@ -6283,7 +6584,7 @@
         </p:blipFill>
         <p:spPr>
           <a:xfrm>
-            <a:off x="253946" y="3184582"/>
+            <a:off x="253946" y="3278711"/>
             <a:ext cx="7463706" cy="1135781"/>
           </a:xfrm>
           <a:prstGeom prst="rect">
@@ -7248,8 +7549,8 @@
           </a:p>
         </p:txBody>
       </p:sp>
-      <mc:AlternateContent xmlns:mc="http://schemas.openxmlformats.org/markup-compatibility/2006">
-        <mc:Choice xmlns:a14="http://schemas.microsoft.com/office/drawing/2010/main" Requires="a14">
+      <mc:AlternateContent xmlns:mc="http://schemas.openxmlformats.org/markup-compatibility/2006" xmlns:a14="http://schemas.microsoft.com/office/drawing/2010/main">
+        <mc:Choice Requires="a14">
           <p:sp>
             <p:nvSpPr>
               <p:cNvPr id="8" name="Text Placeholder 2">
@@ -7330,34 +7631,46 @@
                 <a14:m>
                   <m:oMath xmlns:m="http://schemas.openxmlformats.org/officeDocument/2006/math">
                     <m:r>
-                      <a:rPr lang="pt-BR" sz="2000" i="1"/>
+                      <a:rPr lang="pt-BR" sz="2000" i="1">
+                        <a:latin typeface="Cambria Math" panose="02040503050406030204" pitchFamily="18" charset="0"/>
+                      </a:rPr>
                       <m:t>𝑂</m:t>
                     </m:r>
                     <m:r>
-                      <a:rPr lang="pt-BR" sz="2000" i="1"/>
+                      <a:rPr lang="pt-BR" sz="2000" i="1">
+                        <a:latin typeface="Cambria Math" panose="02040503050406030204" pitchFamily="18" charset="0"/>
+                      </a:rPr>
                       <m:t>(</m:t>
                     </m:r>
                     <m:sSup>
                       <m:sSupPr>
                         <m:ctrlPr>
-                          <a:rPr lang="pt-BR" sz="2000" i="1"/>
+                          <a:rPr lang="pt-BR" sz="2000" i="1">
+                            <a:latin typeface="Cambria Math" panose="02040503050406030204" pitchFamily="18" charset="0"/>
+                          </a:rPr>
                         </m:ctrlPr>
                       </m:sSupPr>
                       <m:e>
                         <m:r>
-                          <a:rPr lang="pt-BR" sz="2000" i="1"/>
+                          <a:rPr lang="pt-BR" sz="2000" i="1">
+                            <a:latin typeface="Cambria Math" panose="02040503050406030204" pitchFamily="18" charset="0"/>
+                          </a:rPr>
                           <m:t>2</m:t>
                         </m:r>
                       </m:e>
                       <m:sup>
                         <m:r>
-                          <a:rPr lang="pt-BR" sz="2000" i="1"/>
+                          <a:rPr lang="pt-BR" sz="2000" i="1">
+                            <a:latin typeface="Cambria Math" panose="02040503050406030204" pitchFamily="18" charset="0"/>
+                          </a:rPr>
                           <m:t>𝑛</m:t>
                         </m:r>
                       </m:sup>
                     </m:sSup>
                     <m:r>
-                      <a:rPr lang="pt-BR" sz="2000" i="1"/>
+                      <a:rPr lang="pt-BR" sz="2000" i="1">
+                        <a:latin typeface="Cambria Math" panose="02040503050406030204" pitchFamily="18" charset="0"/>
+                      </a:rPr>
                       <m:t>)</m:t>
                     </m:r>
                   </m:oMath>
@@ -7378,34 +7691,46 @@
                 <a14:m>
                   <m:oMath xmlns:m="http://schemas.openxmlformats.org/officeDocument/2006/math">
                     <m:r>
-                      <a:rPr lang="pt-BR" sz="2000" i="1"/>
+                      <a:rPr lang="pt-BR" sz="2000" i="1">
+                        <a:latin typeface="Cambria Math" panose="02040503050406030204" pitchFamily="18" charset="0"/>
+                      </a:rPr>
                       <m:t>𝑂</m:t>
                     </m:r>
                     <m:r>
-                      <a:rPr lang="pt-BR" sz="2000" i="1"/>
+                      <a:rPr lang="pt-BR" sz="2000" i="1">
+                        <a:latin typeface="Cambria Math" panose="02040503050406030204" pitchFamily="18" charset="0"/>
+                      </a:rPr>
                       <m:t>(</m:t>
                     </m:r>
                     <m:sSup>
                       <m:sSupPr>
                         <m:ctrlPr>
-                          <a:rPr lang="pt-BR" sz="2000" i="1"/>
+                          <a:rPr lang="pt-BR" sz="2000" i="1">
+                            <a:latin typeface="Cambria Math" panose="02040503050406030204" pitchFamily="18" charset="0"/>
+                          </a:rPr>
                         </m:ctrlPr>
                       </m:sSupPr>
                       <m:e>
                         <m:r>
-                          <a:rPr lang="pt-BR" sz="2000" i="1"/>
+                          <a:rPr lang="pt-BR" sz="2000" i="1">
+                            <a:latin typeface="Cambria Math" panose="02040503050406030204" pitchFamily="18" charset="0"/>
+                          </a:rPr>
                           <m:t>𝑛</m:t>
                         </m:r>
                       </m:e>
                       <m:sup>
                         <m:r>
-                          <a:rPr lang="pt-BR" sz="2000" i="1"/>
+                          <a:rPr lang="pt-BR" sz="2000" i="1">
+                            <a:latin typeface="Cambria Math" panose="02040503050406030204" pitchFamily="18" charset="0"/>
+                          </a:rPr>
                           <m:t>2</m:t>
                         </m:r>
                       </m:sup>
                     </m:sSup>
                     <m:r>
-                      <a:rPr lang="pt-BR" sz="2000" i="1"/>
+                      <a:rPr lang="pt-BR" sz="2000" i="1">
+                        <a:latin typeface="Cambria Math" panose="02040503050406030204" pitchFamily="18" charset="0"/>
+                      </a:rPr>
                       <m:t>)</m:t>
                     </m:r>
                   </m:oMath>
@@ -7426,19 +7751,27 @@
                 <a14:m>
                   <m:oMath xmlns:m="http://schemas.openxmlformats.org/officeDocument/2006/math">
                     <m:r>
-                      <a:rPr lang="pt-BR" sz="2000" i="1"/>
+                      <a:rPr lang="pt-BR" sz="2000" i="1">
+                        <a:latin typeface="Cambria Math" panose="02040503050406030204" pitchFamily="18" charset="0"/>
+                      </a:rPr>
                       <m:t>𝑂</m:t>
                     </m:r>
                     <m:r>
-                      <a:rPr lang="pt-BR" sz="2000" i="1"/>
+                      <a:rPr lang="pt-BR" sz="2000" i="1">
+                        <a:latin typeface="Cambria Math" panose="02040503050406030204" pitchFamily="18" charset="0"/>
+                      </a:rPr>
                       <m:t>(</m:t>
                     </m:r>
                     <m:r>
-                      <a:rPr lang="pt-BR" sz="2000" i="1"/>
+                      <a:rPr lang="pt-BR" sz="2000" i="1">
+                        <a:latin typeface="Cambria Math" panose="02040503050406030204" pitchFamily="18" charset="0"/>
+                      </a:rPr>
                       <m:t>𝑛</m:t>
                     </m:r>
                     <m:r>
-                      <a:rPr lang="pt-BR" sz="2000" i="1"/>
+                      <a:rPr lang="pt-BR" sz="2000" i="1">
+                        <a:latin typeface="Cambria Math" panose="02040503050406030204" pitchFamily="18" charset="0"/>
+                      </a:rPr>
                       <m:t>)</m:t>
                     </m:r>
                   </m:oMath>
@@ -7459,30 +7792,42 @@
                 <a14:m>
                   <m:oMath xmlns:m="http://schemas.openxmlformats.org/officeDocument/2006/math">
                     <m:r>
-                      <a:rPr lang="pt-BR" sz="2000" i="1"/>
+                      <a:rPr lang="pt-BR" sz="2000" i="1">
+                        <a:latin typeface="Cambria Math" panose="02040503050406030204" pitchFamily="18" charset="0"/>
+                      </a:rPr>
                       <m:t>𝑂</m:t>
                     </m:r>
                     <m:r>
-                      <a:rPr lang="pt-BR" sz="2000" i="1"/>
+                      <a:rPr lang="pt-BR" sz="2000" i="1">
+                        <a:latin typeface="Cambria Math" panose="02040503050406030204" pitchFamily="18" charset="0"/>
+                      </a:rPr>
                       <m:t>(</m:t>
                     </m:r>
                     <m:r>
                       <m:rPr>
                         <m:sty m:val="p"/>
                       </m:rPr>
-                      <a:rPr lang="pt-BR" sz="2000"/>
+                      <a:rPr lang="pt-BR" sz="2000">
+                        <a:latin typeface="Cambria Math" panose="02040503050406030204" pitchFamily="18" charset="0"/>
+                      </a:rPr>
                       <m:t>log</m:t>
                     </m:r>
                     <m:r>
-                      <a:rPr lang="pt-BR" sz="2000" i="1"/>
+                      <a:rPr lang="pt-BR" sz="2000" i="1">
+                        <a:latin typeface="Cambria Math" panose="02040503050406030204" pitchFamily="18" charset="0"/>
+                      </a:rPr>
                       <m:t>⁡</m:t>
                     </m:r>
                     <m:r>
-                      <a:rPr lang="pt-BR" sz="2000" i="1"/>
+                      <a:rPr lang="pt-BR" sz="2000" i="1">
+                        <a:latin typeface="Cambria Math" panose="02040503050406030204" pitchFamily="18" charset="0"/>
+                      </a:rPr>
                       <m:t>𝑛</m:t>
                     </m:r>
                     <m:r>
-                      <a:rPr lang="pt-BR" sz="2000" i="1"/>
+                      <a:rPr lang="pt-BR" sz="2000" i="1">
+                        <a:latin typeface="Cambria Math" panose="02040503050406030204" pitchFamily="18" charset="0"/>
+                      </a:rPr>
                       <m:t>)</m:t>
                     </m:r>
                   </m:oMath>
@@ -7495,7 +7840,7 @@
             </p:txBody>
           </p:sp>
         </mc:Choice>
-        <mc:Fallback>
+        <mc:Fallback xmlns="">
           <p:sp>
             <p:nvSpPr>
               <p:cNvPr id="8" name="Text Placeholder 2">
@@ -7668,43 +8013,41 @@
               <a:buNone/>
             </a:pPr>
             <a:r>
+              <a:rPr lang="pt-BR" sz="2000" b="1" i="1" dirty="0">
+                <a:latin typeface="Times New Roman" panose="02020603050405020304" pitchFamily="18" charset="0"/>
+                <a:cs typeface="Times New Roman" panose="02020603050405020304" pitchFamily="18" charset="0"/>
+              </a:rPr>
+              <a:t>Respostas</a:t>
+            </a:r>
+            <a:r>
               <a:rPr lang="pt-BR" sz="2000" i="1" dirty="0">
                 <a:latin typeface="Times New Roman" panose="02020603050405020304" pitchFamily="18" charset="0"/>
                 <a:cs typeface="Times New Roman" panose="02020603050405020304" pitchFamily="18" charset="0"/>
               </a:rPr>
-              <a:t>(</a:t>
+              <a:t>: ( </a:t>
             </a:r>
             <a:r>
               <a:rPr lang="pt-BR" sz="2000" b="1" i="1" dirty="0">
-                <a:latin typeface="Times New Roman" panose="02020603050405020304" pitchFamily="18" charset="0"/>
-                <a:cs typeface="Times New Roman" panose="02020603050405020304" pitchFamily="18" charset="0"/>
-              </a:rPr>
-              <a:t>Respostas</a:t>
+                <a:solidFill>
+                  <a:srgbClr val="FF0000"/>
+                </a:solidFill>
+                <a:latin typeface="Times New Roman" panose="02020603050405020304" pitchFamily="18" charset="0"/>
+                <a:cs typeface="Times New Roman" panose="02020603050405020304" pitchFamily="18" charset="0"/>
+              </a:rPr>
+              <a:t>1-b; 		2-b; 	3-c </a:t>
             </a:r>
             <a:r>
               <a:rPr lang="pt-BR" sz="2000" i="1" dirty="0">
                 <a:latin typeface="Times New Roman" panose="02020603050405020304" pitchFamily="18" charset="0"/>
                 <a:cs typeface="Times New Roman" panose="02020603050405020304" pitchFamily="18" charset="0"/>
               </a:rPr>
-              <a:t>: </a:t>
-            </a:r>
-            <a:r>
-              <a:rPr lang="pt-BR" sz="2000" b="1" i="1" dirty="0">
-                <a:solidFill>
-                  <a:srgbClr val="FF0000"/>
-                </a:solidFill>
-                <a:latin typeface="Times New Roman" panose="02020603050405020304" pitchFamily="18" charset="0"/>
-                <a:cs typeface="Times New Roman" panose="02020603050405020304" pitchFamily="18" charset="0"/>
-              </a:rPr>
-              <a:t>1-b; 		2-b; 	3-c</a:t>
-            </a:r>
-            <a:r>
-              <a:rPr lang="pt-BR" sz="2000" i="1" dirty="0">
-                <a:latin typeface="Times New Roman" panose="02020603050405020304" pitchFamily="18" charset="0"/>
-                <a:cs typeface="Times New Roman" panose="02020603050405020304" pitchFamily="18" charset="0"/>
-              </a:rPr>
               <a:t>)</a:t>
             </a:r>
+          </a:p>
+          <a:p>
+            <a:pPr marL="0" indent="0">
+              <a:buNone/>
+            </a:pPr>
             <a:endParaRPr lang="pt-BR" sz="2000" dirty="0">
               <a:latin typeface="Times New Roman" panose="02020603050405020304" pitchFamily="18" charset="0"/>
               <a:cs typeface="Times New Roman" panose="02020603050405020304" pitchFamily="18" charset="0"/>
@@ -9883,11 +10226,49 @@
               <a:buNone/>
             </a:pPr>
             <a:r>
+              <a:rPr lang="pt-BR" sz="2000" b="1" dirty="0">
+                <a:latin typeface="Times New Roman" panose="02020603050405020304" pitchFamily="18" charset="0"/>
+                <a:cs typeface="Times New Roman" panose="02020603050405020304" pitchFamily="18" charset="0"/>
+              </a:rPr>
+              <a:t>Técnica</a:t>
+            </a:r>
+            <a:r>
               <a:rPr lang="pt-BR" sz="2000" dirty="0">
                 <a:latin typeface="Times New Roman" panose="02020603050405020304" pitchFamily="18" charset="0"/>
                 <a:cs typeface="Times New Roman" panose="02020603050405020304" pitchFamily="18" charset="0"/>
               </a:rPr>
-              <a:t>Técnica para otimizar performance de problemas complexos. </a:t>
+              <a:t> para </a:t>
+            </a:r>
+            <a:r>
+              <a:rPr lang="pt-BR" sz="2000" b="1" dirty="0">
+                <a:solidFill>
+                  <a:srgbClr val="FF0000"/>
+                </a:solidFill>
+                <a:latin typeface="Times New Roman" panose="02020603050405020304" pitchFamily="18" charset="0"/>
+                <a:cs typeface="Times New Roman" panose="02020603050405020304" pitchFamily="18" charset="0"/>
+              </a:rPr>
+              <a:t>otimizar performance </a:t>
+            </a:r>
+            <a:r>
+              <a:rPr lang="pt-BR" sz="2000" dirty="0">
+                <a:latin typeface="Times New Roman" panose="02020603050405020304" pitchFamily="18" charset="0"/>
+                <a:cs typeface="Times New Roman" panose="02020603050405020304" pitchFamily="18" charset="0"/>
+              </a:rPr>
+              <a:t>de </a:t>
+            </a:r>
+            <a:r>
+              <a:rPr lang="pt-BR" sz="2000" b="1" dirty="0">
+                <a:latin typeface="Times New Roman" panose="02020603050405020304" pitchFamily="18" charset="0"/>
+                <a:cs typeface="Times New Roman" panose="02020603050405020304" pitchFamily="18" charset="0"/>
+              </a:rPr>
+              <a:t>problemas complexos</a:t>
+            </a:r>
+            <a:r>
+              <a:rPr lang="pt-BR" sz="2000" dirty="0">
+                <a:latin typeface="Times New Roman" panose="02020603050405020304" pitchFamily="18" charset="0"/>
+                <a:cs typeface="Times New Roman" panose="02020603050405020304" pitchFamily="18" charset="0"/>
+              </a:rPr>
+              <a:t>. </a:t>
             </a:r>
           </a:p>
           <a:p>
@@ -9904,11 +10285,18 @@
               <a:buNone/>
             </a:pPr>
             <a:r>
+              <a:rPr lang="pt-BR" sz="2000" b="1" dirty="0">
+                <a:latin typeface="Times New Roman" panose="02020603050405020304" pitchFamily="18" charset="0"/>
+                <a:cs typeface="Times New Roman" panose="02020603050405020304" pitchFamily="18" charset="0"/>
+              </a:rPr>
+              <a:t>Desafio do tempo</a:t>
+            </a:r>
+            <a:r>
               <a:rPr lang="pt-BR" sz="2000" dirty="0">
                 <a:latin typeface="Times New Roman" panose="02020603050405020304" pitchFamily="18" charset="0"/>
                 <a:cs typeface="Times New Roman" panose="02020603050405020304" pitchFamily="18" charset="0"/>
               </a:rPr>
-              <a:t>Desafio do tempo: O código é uma foto. O código em execução é um filme.</a:t>
+              <a:t>: O código é uma foto. O código em execução é um filme.</a:t>
             </a:r>
           </a:p>
           <a:p>
@@ -9928,6 +10316,16 @@
               <a:buNone/>
             </a:pPr>
             <a:r>
+              <a:rPr lang="pt-BR" sz="2000" b="1" dirty="0">
+                <a:solidFill>
+                  <a:schemeClr val="tx1"/>
+                </a:solidFill>
+                <a:latin typeface="Times New Roman" panose="02020603050405020304" pitchFamily="18" charset="0"/>
+                <a:cs typeface="Times New Roman" panose="02020603050405020304" pitchFamily="18" charset="0"/>
+              </a:rPr>
+              <a:t>Construção incremental</a:t>
+            </a:r>
+            <a:r>
               <a:rPr lang="pt-BR" sz="2000" dirty="0">
                 <a:solidFill>
                   <a:schemeClr val="tx1"/>
@@ -9935,16 +10333,56 @@
                 <a:latin typeface="Times New Roman" panose="02020603050405020304" pitchFamily="18" charset="0"/>
                 <a:cs typeface="Times New Roman" panose="02020603050405020304" pitchFamily="18" charset="0"/>
               </a:rPr>
-              <a:t>Construção incremental: Resolvemos o problema para um subconjunto dos elementos da entrada, um passo de cada vez: iterativa ou recursiva. Em alguns casos, se o </a:t>
-            </a:r>
-            <a:r>
-              <a:rPr lang="pt-BR" sz="2000" dirty="0" err="1">
+              <a:t>: Resolvemos o problema para um </a:t>
+            </a:r>
+            <a:r>
+              <a:rPr lang="pt-BR" sz="2000" b="1" dirty="0">
+                <a:solidFill>
+                  <a:srgbClr val="FF0000"/>
+                </a:solidFill>
+                <a:latin typeface="Times New Roman" panose="02020603050405020304" pitchFamily="18" charset="0"/>
+                <a:cs typeface="Times New Roman" panose="02020603050405020304" pitchFamily="18" charset="0"/>
+              </a:rPr>
+              <a:t>subconjunto dos elementos da entrada</a:t>
+            </a:r>
+            <a:r>
+              <a:rPr lang="pt-BR" sz="2000" dirty="0">
                 <a:solidFill>
                   <a:schemeClr val="tx1"/>
                 </a:solidFill>
                 <a:latin typeface="Times New Roman" panose="02020603050405020304" pitchFamily="18" charset="0"/>
                 <a:cs typeface="Times New Roman" panose="02020603050405020304" pitchFamily="18" charset="0"/>
               </a:rPr>
+              <a:t>, um passo de cada vez: </a:t>
+            </a:r>
+            <a:r>
+              <a:rPr lang="pt-BR" sz="2000" b="1" dirty="0">
+                <a:solidFill>
+                  <a:schemeClr val="tx1"/>
+                </a:solidFill>
+                <a:latin typeface="Times New Roman" panose="02020603050405020304" pitchFamily="18" charset="0"/>
+                <a:cs typeface="Times New Roman" panose="02020603050405020304" pitchFamily="18" charset="0"/>
+              </a:rPr>
+              <a:t>iterativa ou recursiva</a:t>
+            </a:r>
+            <a:r>
+              <a:rPr lang="pt-BR" sz="2000" dirty="0">
+                <a:solidFill>
+                  <a:schemeClr val="tx1"/>
+                </a:solidFill>
+                <a:latin typeface="Times New Roman" panose="02020603050405020304" pitchFamily="18" charset="0"/>
+                <a:cs typeface="Times New Roman" panose="02020603050405020304" pitchFamily="18" charset="0"/>
+              </a:rPr>
+              <a:t>. Em alguns casos, se o </a:t>
+            </a:r>
+            <a:r>
+              <a:rPr lang="pt-BR" sz="2000" b="1" dirty="0" err="1">
+                <a:solidFill>
+                  <a:schemeClr val="tx1"/>
+                </a:solidFill>
+                <a:latin typeface="Times New Roman" panose="02020603050405020304" pitchFamily="18" charset="0"/>
+                <a:cs typeface="Times New Roman" panose="02020603050405020304" pitchFamily="18" charset="0"/>
+              </a:rPr>
               <a:t>array</a:t>
             </a:r>
             <a:r>
@@ -9955,7 +10393,47 @@
                 <a:latin typeface="Times New Roman" panose="02020603050405020304" pitchFamily="18" charset="0"/>
                 <a:cs typeface="Times New Roman" panose="02020603050405020304" pitchFamily="18" charset="0"/>
               </a:rPr>
-              <a:t> estiverem numa orem ruim, o algoritmo perde a eficiência.</a:t>
+              <a:t> estiverem numa </a:t>
+            </a:r>
+            <a:r>
+              <a:rPr lang="pt-BR" sz="2000" b="1" dirty="0">
+                <a:solidFill>
+                  <a:srgbClr val="FF0000"/>
+                </a:solidFill>
+                <a:latin typeface="Times New Roman" panose="02020603050405020304" pitchFamily="18" charset="0"/>
+                <a:cs typeface="Times New Roman" panose="02020603050405020304" pitchFamily="18" charset="0"/>
+              </a:rPr>
+              <a:t>ordem ruim</a:t>
+            </a:r>
+            <a:r>
+              <a:rPr lang="pt-BR" sz="2000" dirty="0">
+                <a:solidFill>
+                  <a:schemeClr val="tx1"/>
+                </a:solidFill>
+                <a:latin typeface="Times New Roman" panose="02020603050405020304" pitchFamily="18" charset="0"/>
+                <a:cs typeface="Times New Roman" panose="02020603050405020304" pitchFamily="18" charset="0"/>
+              </a:rPr>
+              <a:t>, o </a:t>
+            </a:r>
+            <a:r>
+              <a:rPr lang="pt-BR" sz="2000" b="1" dirty="0">
+                <a:solidFill>
+                  <a:schemeClr val="tx1"/>
+                </a:solidFill>
+                <a:latin typeface="Times New Roman" panose="02020603050405020304" pitchFamily="18" charset="0"/>
+                <a:cs typeface="Times New Roman" panose="02020603050405020304" pitchFamily="18" charset="0"/>
+              </a:rPr>
+              <a:t>algoritmo perde a eficiência</a:t>
+            </a:r>
+            <a:r>
+              <a:rPr lang="pt-BR" sz="2000" dirty="0">
+                <a:solidFill>
+                  <a:schemeClr val="tx1"/>
+                </a:solidFill>
+                <a:latin typeface="Times New Roman" panose="02020603050405020304" pitchFamily="18" charset="0"/>
+                <a:cs typeface="Times New Roman" panose="02020603050405020304" pitchFamily="18" charset="0"/>
+              </a:rPr>
+              <a:t>.</a:t>
             </a:r>
           </a:p>
           <a:p>
@@ -9975,6 +10453,16 @@
               <a:buNone/>
             </a:pPr>
             <a:r>
+              <a:rPr lang="pt-BR" sz="2000" b="1" dirty="0">
+                <a:solidFill>
+                  <a:schemeClr val="tx1"/>
+                </a:solidFill>
+                <a:latin typeface="Times New Roman" panose="02020603050405020304" pitchFamily="18" charset="0"/>
+                <a:cs typeface="Times New Roman" panose="02020603050405020304" pitchFamily="18" charset="0"/>
+              </a:rPr>
+              <a:t>Ex</a:t>
+            </a:r>
+            <a:r>
               <a:rPr lang="pt-BR" sz="2000" dirty="0">
                 <a:solidFill>
                   <a:schemeClr val="tx1"/>
@@ -9982,7 +10470,67 @@
                 <a:latin typeface="Times New Roman" panose="02020603050405020304" pitchFamily="18" charset="0"/>
                 <a:cs typeface="Times New Roman" panose="02020603050405020304" pitchFamily="18" charset="0"/>
               </a:rPr>
-              <a:t>Ex. Cálculo Fatorial de n, solução iterativa ou recursiva.</a:t>
+              <a:t>. </a:t>
+            </a:r>
+            <a:r>
+              <a:rPr lang="pt-BR" sz="2000" b="1" dirty="0">
+                <a:solidFill>
+                  <a:srgbClr val="FF0000"/>
+                </a:solidFill>
+                <a:latin typeface="Times New Roman" panose="02020603050405020304" pitchFamily="18" charset="0"/>
+                <a:cs typeface="Times New Roman" panose="02020603050405020304" pitchFamily="18" charset="0"/>
+              </a:rPr>
+              <a:t>Cálculo Fatorial de n</a:t>
+            </a:r>
+            <a:r>
+              <a:rPr lang="pt-BR" sz="2000" dirty="0">
+                <a:solidFill>
+                  <a:schemeClr val="tx1"/>
+                </a:solidFill>
+                <a:latin typeface="Times New Roman" panose="02020603050405020304" pitchFamily="18" charset="0"/>
+                <a:cs typeface="Times New Roman" panose="02020603050405020304" pitchFamily="18" charset="0"/>
+              </a:rPr>
+              <a:t>, solução </a:t>
+            </a:r>
+            <a:r>
+              <a:rPr lang="pt-BR" sz="2000" b="1" dirty="0">
+                <a:solidFill>
+                  <a:schemeClr val="tx1"/>
+                </a:solidFill>
+                <a:latin typeface="Times New Roman" panose="02020603050405020304" pitchFamily="18" charset="0"/>
+                <a:cs typeface="Times New Roman" panose="02020603050405020304" pitchFamily="18" charset="0"/>
+              </a:rPr>
+              <a:t>iterativa</a:t>
+            </a:r>
+            <a:r>
+              <a:rPr lang="pt-BR" sz="2000" dirty="0">
+                <a:solidFill>
+                  <a:schemeClr val="tx1"/>
+                </a:solidFill>
+                <a:latin typeface="Times New Roman" panose="02020603050405020304" pitchFamily="18" charset="0"/>
+                <a:cs typeface="Times New Roman" panose="02020603050405020304" pitchFamily="18" charset="0"/>
+              </a:rPr>
+              <a:t> ou </a:t>
+            </a:r>
+            <a:r>
+              <a:rPr lang="pt-BR" sz="2000" b="1" dirty="0">
+                <a:solidFill>
+                  <a:srgbClr val="FF0000"/>
+                </a:solidFill>
+                <a:latin typeface="Times New Roman" panose="02020603050405020304" pitchFamily="18" charset="0"/>
+                <a:cs typeface="Times New Roman" panose="02020603050405020304" pitchFamily="18" charset="0"/>
+              </a:rPr>
+              <a:t>recursiva</a:t>
+            </a:r>
+            <a:r>
+              <a:rPr lang="pt-BR" sz="2000" dirty="0">
+                <a:solidFill>
+                  <a:schemeClr val="tx1"/>
+                </a:solidFill>
+                <a:latin typeface="Times New Roman" panose="02020603050405020304" pitchFamily="18" charset="0"/>
+                <a:cs typeface="Times New Roman" panose="02020603050405020304" pitchFamily="18" charset="0"/>
+              </a:rPr>
+              <a:t>.</a:t>
             </a:r>
           </a:p>
         </p:txBody>
@@ -10116,21 +10664,131 @@
               <a:buNone/>
             </a:pPr>
             <a:r>
-              <a:rPr lang="pt-BR" sz="2000" dirty="0">
+              <a:rPr lang="pt-BR" sz="1800" b="1" dirty="0">
                 <a:solidFill>
                   <a:schemeClr val="tx1"/>
                 </a:solidFill>
                 <a:latin typeface="Times New Roman" panose="02020603050405020304" pitchFamily="18" charset="0"/>
                 <a:cs typeface="Times New Roman" panose="02020603050405020304" pitchFamily="18" charset="0"/>
               </a:rPr>
-              <a:t>Construção Divisão e Conquista: o problema principal é decomposto em subproblemas menores, combinando as respostas e cada subproblemas, a conquista é a solução.</a:t>
+              <a:t>Construção Divisão e Conquista</a:t>
+            </a:r>
+            <a:r>
+              <a:rPr lang="pt-BR" sz="1800" dirty="0">
+                <a:solidFill>
+                  <a:schemeClr val="tx1"/>
+                </a:solidFill>
+                <a:latin typeface="Times New Roman" panose="02020603050405020304" pitchFamily="18" charset="0"/>
+                <a:cs typeface="Times New Roman" panose="02020603050405020304" pitchFamily="18" charset="0"/>
+              </a:rPr>
+              <a:t>: o </a:t>
+            </a:r>
+            <a:r>
+              <a:rPr lang="pt-BR" sz="1800" b="1" dirty="0">
+                <a:solidFill>
+                  <a:srgbClr val="FF0000"/>
+                </a:solidFill>
+                <a:latin typeface="Times New Roman" panose="02020603050405020304" pitchFamily="18" charset="0"/>
+                <a:cs typeface="Times New Roman" panose="02020603050405020304" pitchFamily="18" charset="0"/>
+              </a:rPr>
+              <a:t>problema</a:t>
+            </a:r>
+            <a:r>
+              <a:rPr lang="pt-BR" sz="1800" dirty="0">
+                <a:solidFill>
+                  <a:schemeClr val="tx1"/>
+                </a:solidFill>
+                <a:latin typeface="Times New Roman" panose="02020603050405020304" pitchFamily="18" charset="0"/>
+                <a:cs typeface="Times New Roman" panose="02020603050405020304" pitchFamily="18" charset="0"/>
+              </a:rPr>
+              <a:t> </a:t>
+            </a:r>
+            <a:r>
+              <a:rPr lang="pt-BR" sz="1800" b="1" dirty="0">
+                <a:solidFill>
+                  <a:srgbClr val="FF0000"/>
+                </a:solidFill>
+                <a:latin typeface="Times New Roman" panose="02020603050405020304" pitchFamily="18" charset="0"/>
+                <a:cs typeface="Times New Roman" panose="02020603050405020304" pitchFamily="18" charset="0"/>
+              </a:rPr>
+              <a:t>principal</a:t>
+            </a:r>
+            <a:r>
+              <a:rPr lang="pt-BR" sz="1800" dirty="0">
+                <a:solidFill>
+                  <a:schemeClr val="tx1"/>
+                </a:solidFill>
+                <a:latin typeface="Times New Roman" panose="02020603050405020304" pitchFamily="18" charset="0"/>
+                <a:cs typeface="Times New Roman" panose="02020603050405020304" pitchFamily="18" charset="0"/>
+              </a:rPr>
+              <a:t> é decomposto em </a:t>
+            </a:r>
+            <a:r>
+              <a:rPr lang="pt-BR" sz="1800" b="1" dirty="0">
+                <a:solidFill>
+                  <a:srgbClr val="FF0000"/>
+                </a:solidFill>
+                <a:latin typeface="Times New Roman" panose="02020603050405020304" pitchFamily="18" charset="0"/>
+                <a:cs typeface="Times New Roman" panose="02020603050405020304" pitchFamily="18" charset="0"/>
+              </a:rPr>
+              <a:t>subproblemas menores</a:t>
+            </a:r>
+            <a:r>
+              <a:rPr lang="pt-BR" sz="1800" dirty="0">
+                <a:solidFill>
+                  <a:schemeClr val="tx1"/>
+                </a:solidFill>
+                <a:latin typeface="Times New Roman" panose="02020603050405020304" pitchFamily="18" charset="0"/>
+                <a:cs typeface="Times New Roman" panose="02020603050405020304" pitchFamily="18" charset="0"/>
+              </a:rPr>
+              <a:t>, combinando as respostas e cada subproblemas, a </a:t>
+            </a:r>
+            <a:r>
+              <a:rPr lang="pt-BR" sz="1800" b="1" dirty="0">
+                <a:solidFill>
+                  <a:srgbClr val="FF0000"/>
+                </a:solidFill>
+                <a:latin typeface="Times New Roman" panose="02020603050405020304" pitchFamily="18" charset="0"/>
+                <a:cs typeface="Times New Roman" panose="02020603050405020304" pitchFamily="18" charset="0"/>
+              </a:rPr>
+              <a:t>conquista</a:t>
+            </a:r>
+            <a:r>
+              <a:rPr lang="pt-BR" sz="1800" dirty="0">
+                <a:solidFill>
+                  <a:schemeClr val="tx1"/>
+                </a:solidFill>
+                <a:latin typeface="Times New Roman" panose="02020603050405020304" pitchFamily="18" charset="0"/>
+                <a:cs typeface="Times New Roman" panose="02020603050405020304" pitchFamily="18" charset="0"/>
+              </a:rPr>
+              <a:t> é a </a:t>
+            </a:r>
+            <a:r>
+              <a:rPr lang="pt-BR" sz="1800" b="1" dirty="0">
+                <a:solidFill>
+                  <a:schemeClr val="tx1"/>
+                </a:solidFill>
+                <a:latin typeface="Times New Roman" panose="02020603050405020304" pitchFamily="18" charset="0"/>
+                <a:cs typeface="Times New Roman" panose="02020603050405020304" pitchFamily="18" charset="0"/>
+              </a:rPr>
+              <a:t>solução</a:t>
+            </a:r>
+            <a:r>
+              <a:rPr lang="pt-BR" sz="1800" dirty="0">
+                <a:solidFill>
+                  <a:schemeClr val="tx1"/>
+                </a:solidFill>
+                <a:latin typeface="Times New Roman" panose="02020603050405020304" pitchFamily="18" charset="0"/>
+                <a:cs typeface="Times New Roman" panose="02020603050405020304" pitchFamily="18" charset="0"/>
+              </a:rPr>
+              <a:t>.</a:t>
             </a:r>
           </a:p>
           <a:p>
             <a:pPr marL="0" indent="0" algn="just">
               <a:buNone/>
             </a:pPr>
-            <a:endParaRPr lang="pt-BR" sz="2000" dirty="0">
+            <a:endParaRPr lang="pt-BR" sz="1800" dirty="0">
               <a:solidFill>
                 <a:schemeClr val="tx1"/>
               </a:solidFill>
@@ -10143,27 +10801,37 @@
               <a:buNone/>
             </a:pPr>
             <a:r>
-              <a:rPr lang="pt-BR" sz="2000" dirty="0">
+              <a:rPr lang="pt-BR" sz="1800" b="1" dirty="0">
                 <a:solidFill>
                   <a:schemeClr val="tx1"/>
                 </a:solidFill>
                 <a:latin typeface="Times New Roman" panose="02020603050405020304" pitchFamily="18" charset="0"/>
                 <a:cs typeface="Times New Roman" panose="02020603050405020304" pitchFamily="18" charset="0"/>
               </a:rPr>
-              <a:t>Construção Tentativa e Erro: Testa a solução, se der falhar, volta um passo para trás, usando recursão, </a:t>
-            </a:r>
-            <a:r>
-              <a:rPr lang="pt-BR" sz="2000" b="1" dirty="0" err="1">
+              <a:t>Construção Tentativa e Erro</a:t>
+            </a:r>
+            <a:r>
+              <a:rPr lang="pt-BR" sz="1800" dirty="0">
                 <a:solidFill>
                   <a:schemeClr val="tx1"/>
                 </a:solidFill>
                 <a:latin typeface="Times New Roman" panose="02020603050405020304" pitchFamily="18" charset="0"/>
                 <a:cs typeface="Times New Roman" panose="02020603050405020304" pitchFamily="18" charset="0"/>
               </a:rPr>
+              <a:t>: Testa a solução, se der falhar, volta um passo para trás, usando recursão, </a:t>
+            </a:r>
+            <a:r>
+              <a:rPr lang="pt-BR" sz="1800" b="1" dirty="0" err="1">
+                <a:solidFill>
+                  <a:schemeClr val="tx1"/>
+                </a:solidFill>
+                <a:latin typeface="Times New Roman" panose="02020603050405020304" pitchFamily="18" charset="0"/>
+                <a:cs typeface="Times New Roman" panose="02020603050405020304" pitchFamily="18" charset="0"/>
+              </a:rPr>
               <a:t>backtracking</a:t>
             </a:r>
             <a:r>
-              <a:rPr lang="pt-BR" sz="2000" dirty="0">
+              <a:rPr lang="pt-BR" sz="1800" dirty="0">
                 <a:solidFill>
                   <a:schemeClr val="tx1"/>
                 </a:solidFill>
@@ -10173,7 +10841,7 @@
               <a:t>, refinamento do algoritmo de busca por força bruta. Busca todas as soluções possíveis e seleciona a melhor. </a:t>
             </a:r>
             <a:r>
-              <a:rPr lang="pt-BR" sz="2000" b="1" dirty="0">
+              <a:rPr lang="pt-BR" sz="1800" b="1" dirty="0">
                 <a:solidFill>
                   <a:srgbClr val="FF0000"/>
                 </a:solidFill>
@@ -10183,7 +10851,7 @@
               <a:t>Inviável para n grandes</a:t>
             </a:r>
             <a:r>
-              <a:rPr lang="pt-BR" sz="2000" dirty="0">
+              <a:rPr lang="pt-BR" sz="1800" dirty="0">
                 <a:solidFill>
                   <a:schemeClr val="tx1"/>
                 </a:solidFill>
@@ -10197,7 +10865,7 @@
             <a:pPr marL="0" indent="0" algn="just">
               <a:buNone/>
             </a:pPr>
-            <a:endParaRPr lang="pt-BR" sz="2000" dirty="0">
+            <a:endParaRPr lang="pt-BR" sz="1800" dirty="0">
               <a:solidFill>
                 <a:schemeClr val="tx1"/>
               </a:solidFill>
@@ -10210,14 +10878,24 @@
               <a:buNone/>
             </a:pPr>
             <a:r>
-              <a:rPr lang="pt-BR" sz="2000" dirty="0">
+              <a:rPr lang="pt-BR" sz="1800" b="1" dirty="0">
                 <a:solidFill>
                   <a:schemeClr val="tx1"/>
                 </a:solidFill>
                 <a:latin typeface="Times New Roman" panose="02020603050405020304" pitchFamily="18" charset="0"/>
                 <a:cs typeface="Times New Roman" panose="02020603050405020304" pitchFamily="18" charset="0"/>
               </a:rPr>
-              <a:t>Construção Algoritmos Gulosos: estratégias de projeto de algoritmos que, a cada passo, escolhem a alternativa que parece ser a melhor naquele momento, na esperança de que essas escolhas locais levem a uma solução ótima global, mas sem garantir o resultado , sem revisitar as escolhas.</a:t>
+              <a:t>Construção Algoritmos Gulosos</a:t>
+            </a:r>
+            <a:r>
+              <a:rPr lang="pt-BR" sz="1800" dirty="0">
+                <a:solidFill>
+                  <a:schemeClr val="tx1"/>
+                </a:solidFill>
+                <a:latin typeface="Times New Roman" panose="02020603050405020304" pitchFamily="18" charset="0"/>
+                <a:cs typeface="Times New Roman" panose="02020603050405020304" pitchFamily="18" charset="0"/>
+              </a:rPr>
+              <a:t>: estratégias de projeto de algoritmos que, a cada passo, escolhem a alternativa que parece ser a melhor naquele momento, na esperança de que essas escolhas locais levem a uma solução ótima global, mas sem garantir o resultado , sem revisitar as escolhas.</a:t>
             </a:r>
           </a:p>
         </p:txBody>
@@ -10351,6 +11029,16 @@
               <a:buNone/>
             </a:pPr>
             <a:r>
+              <a:rPr lang="pt-BR" sz="2000" b="1" dirty="0">
+                <a:solidFill>
+                  <a:schemeClr val="tx1"/>
+                </a:solidFill>
+                <a:latin typeface="Times New Roman" panose="02020603050405020304" pitchFamily="18" charset="0"/>
+                <a:cs typeface="Times New Roman" panose="02020603050405020304" pitchFamily="18" charset="0"/>
+              </a:rPr>
+              <a:t>Construção Programação Dinâmica</a:t>
+            </a:r>
+            <a:r>
               <a:rPr lang="pt-BR" sz="2000" dirty="0">
                 <a:solidFill>
                   <a:schemeClr val="tx1"/>
@@ -10358,7 +11046,7 @@
                 <a:latin typeface="Times New Roman" panose="02020603050405020304" pitchFamily="18" charset="0"/>
                 <a:cs typeface="Times New Roman" panose="02020603050405020304" pitchFamily="18" charset="0"/>
               </a:rPr>
-              <a:t>Construção Programação Dinâmica: A solução ótima pode ser obtida a partir da solução ótima obtida previamente de outros subproblemas que, </a:t>
+              <a:t>: A solução ótima pode ser obtida a partir da solução ótima obtida previamente de outros subproblemas que, </a:t>
             </a:r>
             <a:r>
               <a:rPr lang="pt-BR" sz="2000" b="1" dirty="0">
@@ -10398,6 +11086,16 @@
               <a:buNone/>
             </a:pPr>
             <a:r>
+              <a:rPr lang="pt-BR" sz="2000" b="1" dirty="0">
+                <a:solidFill>
+                  <a:srgbClr val="FF0000"/>
+                </a:solidFill>
+                <a:latin typeface="Times New Roman" panose="02020603050405020304" pitchFamily="18" charset="0"/>
+                <a:cs typeface="Times New Roman" panose="02020603050405020304" pitchFamily="18" charset="0"/>
+              </a:rPr>
+              <a:t>Duas características</a:t>
+            </a:r>
+            <a:r>
               <a:rPr lang="pt-BR" sz="2000" dirty="0">
                 <a:solidFill>
                   <a:schemeClr val="tx1"/>
@@ -10405,7 +11103,17 @@
                 <a:latin typeface="Times New Roman" panose="02020603050405020304" pitchFamily="18" charset="0"/>
                 <a:cs typeface="Times New Roman" panose="02020603050405020304" pitchFamily="18" charset="0"/>
               </a:rPr>
-              <a:t>Duas características: Pode ser implementada de forma iterativa ou recursiva</a:t>
+              <a:t>: Pode ser implementada de forma </a:t>
+            </a:r>
+            <a:r>
+              <a:rPr lang="pt-BR" sz="2000" b="1" dirty="0">
+                <a:solidFill>
+                  <a:srgbClr val="FF0000"/>
+                </a:solidFill>
+                <a:latin typeface="Times New Roman" panose="02020603050405020304" pitchFamily="18" charset="0"/>
+                <a:cs typeface="Times New Roman" panose="02020603050405020304" pitchFamily="18" charset="0"/>
+              </a:rPr>
+              <a:t>iterativa ou recursiva.</a:t>
             </a:r>
           </a:p>
           <a:p>
@@ -10414,6 +11122,16 @@
               <a:buChar char="§"/>
             </a:pPr>
             <a:r>
+              <a:rPr lang="pt-BR" sz="2000" b="1" dirty="0">
+                <a:solidFill>
+                  <a:schemeClr val="tx1"/>
+                </a:solidFill>
+                <a:latin typeface="Times New Roman" panose="02020603050405020304" pitchFamily="18" charset="0"/>
+                <a:cs typeface="Times New Roman" panose="02020603050405020304" pitchFamily="18" charset="0"/>
+              </a:rPr>
+              <a:t>Subestrutura ótima</a:t>
+            </a:r>
+            <a:r>
               <a:rPr lang="pt-BR" sz="2000" dirty="0">
                 <a:solidFill>
                   <a:schemeClr val="tx1"/>
@@ -10421,7 +11139,7 @@
                 <a:latin typeface="Times New Roman" panose="02020603050405020304" pitchFamily="18" charset="0"/>
                 <a:cs typeface="Times New Roman" panose="02020603050405020304" pitchFamily="18" charset="0"/>
               </a:rPr>
-              <a:t>Subestrutura ótima: ocorre quando uma solução ótima pode ser calculada a partir de soluções ótimas de subproblemas.</a:t>
+              <a:t>: ocorre quando uma solução ótima pode ser calculada a partir de soluções ótimas de subproblemas.</a:t>
             </a:r>
           </a:p>
           <a:p>
@@ -10430,6 +11148,16 @@
               <a:buChar char="§"/>
             </a:pPr>
             <a:r>
+              <a:rPr lang="pt-BR" sz="2000" b="1" dirty="0">
+                <a:solidFill>
+                  <a:schemeClr val="tx1"/>
+                </a:solidFill>
+                <a:latin typeface="Times New Roman" panose="02020603050405020304" pitchFamily="18" charset="0"/>
+                <a:cs typeface="Times New Roman" panose="02020603050405020304" pitchFamily="18" charset="0"/>
+              </a:rPr>
+              <a:t>Superposição de subproblemas</a:t>
+            </a:r>
+            <a:r>
               <a:rPr lang="pt-BR" sz="2000" dirty="0">
                 <a:solidFill>
                   <a:schemeClr val="tx1"/>
@@ -10437,7 +11165,47 @@
                 <a:latin typeface="Times New Roman" panose="02020603050405020304" pitchFamily="18" charset="0"/>
                 <a:cs typeface="Times New Roman" panose="02020603050405020304" pitchFamily="18" charset="0"/>
               </a:rPr>
-              <a:t>Superposição de subproblemas: ocorre quando o algoritmo reexamina o mesmo subproblema diversas vezes. </a:t>
+              <a:t>: ocorre quando o algoritmo </a:t>
+            </a:r>
+            <a:r>
+              <a:rPr lang="pt-BR" sz="2000" b="1" dirty="0">
+                <a:solidFill>
+                  <a:srgbClr val="FF0000"/>
+                </a:solidFill>
+                <a:latin typeface="Times New Roman" panose="02020603050405020304" pitchFamily="18" charset="0"/>
+                <a:cs typeface="Times New Roman" panose="02020603050405020304" pitchFamily="18" charset="0"/>
+              </a:rPr>
+              <a:t>reexamina</a:t>
+            </a:r>
+            <a:r>
+              <a:rPr lang="pt-BR" sz="2000" dirty="0">
+                <a:solidFill>
+                  <a:schemeClr val="tx1"/>
+                </a:solidFill>
+                <a:latin typeface="Times New Roman" panose="02020603050405020304" pitchFamily="18" charset="0"/>
+                <a:cs typeface="Times New Roman" panose="02020603050405020304" pitchFamily="18" charset="0"/>
+              </a:rPr>
+              <a:t> o mesmo </a:t>
+            </a:r>
+            <a:r>
+              <a:rPr lang="pt-BR" sz="2000" b="1" dirty="0">
+                <a:solidFill>
+                  <a:srgbClr val="FF0000"/>
+                </a:solidFill>
+                <a:latin typeface="Times New Roman" panose="02020603050405020304" pitchFamily="18" charset="0"/>
+                <a:cs typeface="Times New Roman" panose="02020603050405020304" pitchFamily="18" charset="0"/>
+              </a:rPr>
+              <a:t>subproblema diversas vezes</a:t>
+            </a:r>
+            <a:r>
+              <a:rPr lang="pt-BR" sz="2000" dirty="0">
+                <a:solidFill>
+                  <a:schemeClr val="tx1"/>
+                </a:solidFill>
+                <a:latin typeface="Times New Roman" panose="02020603050405020304" pitchFamily="18" charset="0"/>
+                <a:cs typeface="Times New Roman" panose="02020603050405020304" pitchFamily="18" charset="0"/>
+              </a:rPr>
+              <a:t>. </a:t>
             </a:r>
           </a:p>
         </p:txBody>
@@ -10644,6 +11412,16 @@
               <a:buNone/>
             </a:pPr>
             <a:r>
+              <a:rPr lang="pt-BR" sz="2000" b="1" dirty="0">
+                <a:solidFill>
+                  <a:schemeClr val="tx1"/>
+                </a:solidFill>
+                <a:latin typeface="Times New Roman" panose="02020603050405020304" pitchFamily="18" charset="0"/>
+                <a:cs typeface="Times New Roman" panose="02020603050405020304" pitchFamily="18" charset="0"/>
+              </a:rPr>
+              <a:t>Fibonacci</a:t>
+            </a:r>
+            <a:r>
               <a:rPr lang="pt-BR" sz="2000" dirty="0">
                 <a:solidFill>
                   <a:schemeClr val="tx1"/>
@@ -10651,7 +11429,102 @@
                 <a:latin typeface="Times New Roman" panose="02020603050405020304" pitchFamily="18" charset="0"/>
                 <a:cs typeface="Times New Roman" panose="02020603050405020304" pitchFamily="18" charset="0"/>
               </a:rPr>
-              <a:t>Fibonacci(n) = n, para n&lt;= 1; Fibonacci(n-1) + Fibonacci(n-2), caso contrário.</a:t>
+              <a:t>(n) = 	</a:t>
+            </a:r>
+            <a:r>
+              <a:rPr lang="pt-BR" sz="2000" b="1" dirty="0">
+                <a:solidFill>
+                  <a:srgbClr val="FF0000"/>
+                </a:solidFill>
+                <a:latin typeface="Times New Roman" panose="02020603050405020304" pitchFamily="18" charset="0"/>
+                <a:cs typeface="Times New Roman" panose="02020603050405020304" pitchFamily="18" charset="0"/>
+              </a:rPr>
+              <a:t>n</a:t>
+            </a:r>
+            <a:r>
+              <a:rPr lang="pt-BR" sz="2000" dirty="0">
+                <a:solidFill>
+                  <a:schemeClr val="tx1"/>
+                </a:solidFill>
+                <a:latin typeface="Times New Roman" panose="02020603050405020304" pitchFamily="18" charset="0"/>
+                <a:cs typeface="Times New Roman" panose="02020603050405020304" pitchFamily="18" charset="0"/>
+              </a:rPr>
+              <a:t>, 								para </a:t>
+            </a:r>
+            <a:r>
+              <a:rPr lang="pt-BR" sz="2000" b="1" dirty="0">
+                <a:solidFill>
+                  <a:schemeClr val="tx1"/>
+                </a:solidFill>
+                <a:latin typeface="Times New Roman" panose="02020603050405020304" pitchFamily="18" charset="0"/>
+                <a:cs typeface="Times New Roman" panose="02020603050405020304" pitchFamily="18" charset="0"/>
+              </a:rPr>
+              <a:t>n &lt;= 1</a:t>
+            </a:r>
+            <a:r>
+              <a:rPr lang="pt-BR" sz="2000" dirty="0">
+                <a:solidFill>
+                  <a:schemeClr val="tx1"/>
+                </a:solidFill>
+                <a:latin typeface="Times New Roman" panose="02020603050405020304" pitchFamily="18" charset="0"/>
+                <a:cs typeface="Times New Roman" panose="02020603050405020304" pitchFamily="18" charset="0"/>
+              </a:rPr>
+              <a:t>; </a:t>
+            </a:r>
+          </a:p>
+          <a:p>
+            <a:pPr marL="0" indent="0" algn="just">
+              <a:buNone/>
+            </a:pPr>
+            <a:r>
+              <a:rPr lang="pt-BR" sz="2000" dirty="0">
+                <a:solidFill>
+                  <a:schemeClr val="tx1"/>
+                </a:solidFill>
+                <a:latin typeface="Times New Roman" panose="02020603050405020304" pitchFamily="18" charset="0"/>
+                <a:cs typeface="Times New Roman" panose="02020603050405020304" pitchFamily="18" charset="0"/>
+              </a:rPr>
+              <a:t>				</a:t>
+            </a:r>
+            <a:r>
+              <a:rPr lang="pt-BR" sz="2000" b="1" dirty="0">
+                <a:solidFill>
+                  <a:srgbClr val="FF0000"/>
+                </a:solidFill>
+                <a:latin typeface="Times New Roman" panose="02020603050405020304" pitchFamily="18" charset="0"/>
+                <a:cs typeface="Times New Roman" panose="02020603050405020304" pitchFamily="18" charset="0"/>
+              </a:rPr>
+              <a:t>Fibonacci(n-1) + Fibonacci(n-2)</a:t>
+            </a:r>
+            <a:r>
+              <a:rPr lang="pt-BR" sz="2000" dirty="0">
+                <a:solidFill>
+                  <a:schemeClr val="tx1"/>
+                </a:solidFill>
+                <a:latin typeface="Times New Roman" panose="02020603050405020304" pitchFamily="18" charset="0"/>
+                <a:cs typeface="Times New Roman" panose="02020603050405020304" pitchFamily="18" charset="0"/>
+              </a:rPr>
+              <a:t>, 	</a:t>
+            </a:r>
+            <a:r>
+              <a:rPr lang="pt-BR" sz="2000" b="1" dirty="0">
+                <a:solidFill>
+                  <a:schemeClr val="tx1"/>
+                </a:solidFill>
+                <a:latin typeface="Times New Roman" panose="02020603050405020304" pitchFamily="18" charset="0"/>
+                <a:cs typeface="Times New Roman" panose="02020603050405020304" pitchFamily="18" charset="0"/>
+              </a:rPr>
+              <a:t>caso contrário</a:t>
+            </a:r>
+            <a:r>
+              <a:rPr lang="pt-BR" sz="2000" dirty="0">
+                <a:solidFill>
+                  <a:schemeClr val="tx1"/>
+                </a:solidFill>
+                <a:latin typeface="Times New Roman" panose="02020603050405020304" pitchFamily="18" charset="0"/>
+                <a:cs typeface="Times New Roman" panose="02020603050405020304" pitchFamily="18" charset="0"/>
+              </a:rPr>
+              <a:t>.</a:t>
             </a:r>
           </a:p>
           <a:p>
@@ -10706,7 +11579,7 @@
               <a:t> </a:t>
             </a:r>
             <a:r>
-              <a:rPr lang="pt-BR" sz="2000" dirty="0" err="1">
+              <a:rPr lang="pt-BR" sz="2000" b="1" dirty="0" err="1">
                 <a:solidFill>
                   <a:schemeClr val="tx1"/>
                 </a:solidFill>
@@ -10741,7 +11614,7 @@
               <a:t>   </a:t>
             </a:r>
             <a:r>
-              <a:rPr lang="pt-BR" sz="2000" dirty="0" err="1">
+              <a:rPr lang="pt-BR" sz="2000" b="1" dirty="0" err="1">
                 <a:solidFill>
                   <a:schemeClr val="tx1"/>
                 </a:solidFill>
@@ -10761,7 +11634,7 @@
               <a:t> (n &lt;= 1) </a:t>
             </a:r>
             <a:r>
-              <a:rPr lang="pt-BR" sz="2000" dirty="0" err="1">
+              <a:rPr lang="pt-BR" sz="2000" b="1" dirty="0" err="1">
                 <a:solidFill>
                   <a:schemeClr val="tx1"/>
                 </a:solidFill>
@@ -10796,7 +11669,7 @@
               <a:t>   </a:t>
             </a:r>
             <a:r>
-              <a:rPr lang="pt-BR" sz="2000" dirty="0" err="1">
+              <a:rPr lang="pt-BR" sz="2000" b="1" dirty="0" err="1">
                 <a:solidFill>
                   <a:schemeClr val="tx1"/>
                 </a:solidFill>
@@ -10816,44 +11689,54 @@
               <a:t> </a:t>
             </a:r>
             <a:r>
-              <a:rPr lang="pt-BR" sz="2000" dirty="0" err="1">
+              <a:rPr lang="pt-BR" sz="2000" b="1" dirty="0" err="1">
+                <a:solidFill>
+                  <a:srgbClr val="FF0000"/>
+                </a:solidFill>
+                <a:latin typeface="Times New Roman" panose="02020603050405020304" pitchFamily="18" charset="0"/>
+                <a:cs typeface="Times New Roman" panose="02020603050405020304" pitchFamily="18" charset="0"/>
+              </a:rPr>
+              <a:t>fib</a:t>
+            </a:r>
+            <a:r>
+              <a:rPr lang="pt-BR" sz="2000" b="1" dirty="0">
+                <a:solidFill>
+                  <a:srgbClr val="FF0000"/>
+                </a:solidFill>
+                <a:latin typeface="Times New Roman" panose="02020603050405020304" pitchFamily="18" charset="0"/>
+                <a:cs typeface="Times New Roman" panose="02020603050405020304" pitchFamily="18" charset="0"/>
+              </a:rPr>
+              <a:t>(n-1) + </a:t>
+            </a:r>
+            <a:r>
+              <a:rPr lang="pt-BR" sz="2000" b="1" dirty="0" err="1">
+                <a:solidFill>
+                  <a:srgbClr val="FF0000"/>
+                </a:solidFill>
+                <a:latin typeface="Times New Roman" panose="02020603050405020304" pitchFamily="18" charset="0"/>
+                <a:cs typeface="Times New Roman" panose="02020603050405020304" pitchFamily="18" charset="0"/>
+              </a:rPr>
+              <a:t>fib</a:t>
+            </a:r>
+            <a:r>
+              <a:rPr lang="pt-BR" sz="2000" b="1" dirty="0">
+                <a:solidFill>
+                  <a:srgbClr val="FF0000"/>
+                </a:solidFill>
+                <a:latin typeface="Times New Roman" panose="02020603050405020304" pitchFamily="18" charset="0"/>
+                <a:cs typeface="Times New Roman" panose="02020603050405020304" pitchFamily="18" charset="0"/>
+              </a:rPr>
+              <a:t>(n-2)</a:t>
+            </a:r>
+            <a:r>
+              <a:rPr lang="pt-BR" sz="2000" dirty="0">
                 <a:solidFill>
                   <a:schemeClr val="tx1"/>
                 </a:solidFill>
                 <a:latin typeface="Times New Roman" panose="02020603050405020304" pitchFamily="18" charset="0"/>
                 <a:cs typeface="Times New Roman" panose="02020603050405020304" pitchFamily="18" charset="0"/>
               </a:rPr>
-              <a:t>fib</a:t>
-            </a:r>
-            <a:r>
-              <a:rPr lang="pt-BR" sz="2000" dirty="0">
-                <a:solidFill>
-                  <a:schemeClr val="tx1"/>
-                </a:solidFill>
-                <a:latin typeface="Times New Roman" panose="02020603050405020304" pitchFamily="18" charset="0"/>
-                <a:cs typeface="Times New Roman" panose="02020603050405020304" pitchFamily="18" charset="0"/>
-              </a:rPr>
-              <a:t>(n-1) + </a:t>
-            </a:r>
-            <a:r>
-              <a:rPr lang="pt-BR" sz="2000" dirty="0" err="1">
-                <a:solidFill>
-                  <a:schemeClr val="tx1"/>
-                </a:solidFill>
-                <a:latin typeface="Times New Roman" panose="02020603050405020304" pitchFamily="18" charset="0"/>
-                <a:cs typeface="Times New Roman" panose="02020603050405020304" pitchFamily="18" charset="0"/>
-              </a:rPr>
-              <a:t>fib</a:t>
-            </a:r>
-            <a:r>
-              <a:rPr lang="pt-BR" sz="2000" dirty="0">
-                <a:solidFill>
-                  <a:schemeClr val="tx1"/>
-                </a:solidFill>
-                <a:latin typeface="Times New Roman" panose="02020603050405020304" pitchFamily="18" charset="0"/>
-                <a:cs typeface="Times New Roman" panose="02020603050405020304" pitchFamily="18" charset="0"/>
-              </a:rPr>
-              <a:t>(n-2);</a:t>
+              <a:t>;</a:t>
             </a:r>
           </a:p>
           <a:p>

</xml_diff>